<commit_message>
week 1 and 2
</commit_message>
<xml_diff>
--- a/buttons.pptx
+++ b/buttons.pptx
@@ -6,6 +6,7 @@
   </p:sldMasterIdLst>
   <p:sldIdLst>
     <p:sldId id="256" r:id="rId2"/>
+    <p:sldId id="257" r:id="rId3"/>
   </p:sldIdLst>
   <p:sldSz cx="9144000" cy="6858000" type="screen4x3"/>
   <p:notesSz cx="6858000" cy="9144000"/>
@@ -104,6 +105,22 @@
       </a:defRPr>
     </a:lvl9pPr>
   </p:defaultTextStyle>
+  <p:extLst>
+    <p:ext uri="{EFAFB233-063F-42B5-8137-9DF3F51BA10A}">
+      <p15:sldGuideLst xmlns:p15="http://schemas.microsoft.com/office/powerpoint/2012/main">
+        <p15:guide id="1" orient="horz" pos="2160">
+          <p15:clr>
+            <a:srgbClr val="A4A3A4"/>
+          </p15:clr>
+        </p15:guide>
+        <p15:guide id="2" pos="2880">
+          <p15:clr>
+            <a:srgbClr val="A4A3A4"/>
+          </p15:clr>
+        </p15:guide>
+      </p15:sldGuideLst>
+    </p:ext>
+  </p:extLst>
 </p:presentation>
 </file>
 
@@ -288,7 +305,7 @@
           <a:p>
             <a:fld id="{6160CE2C-618F-9444-BA8A-58E4C525A399}" type="datetimeFigureOut">
               <a:rPr lang="en-US" smtClean="0"/>
-              <a:t>9/2/17</a:t>
+              <a:t>12/31/17</a:t>
             </a:fld>
             <a:endParaRPr lang="en-US"/>
           </a:p>
@@ -458,7 +475,7 @@
           <a:p>
             <a:fld id="{6160CE2C-618F-9444-BA8A-58E4C525A399}" type="datetimeFigureOut">
               <a:rPr lang="en-US" smtClean="0"/>
-              <a:t>9/2/17</a:t>
+              <a:t>12/31/17</a:t>
             </a:fld>
             <a:endParaRPr lang="en-US"/>
           </a:p>
@@ -638,7 +655,7 @@
           <a:p>
             <a:fld id="{6160CE2C-618F-9444-BA8A-58E4C525A399}" type="datetimeFigureOut">
               <a:rPr lang="en-US" smtClean="0"/>
-              <a:t>9/2/17</a:t>
+              <a:t>12/31/17</a:t>
             </a:fld>
             <a:endParaRPr lang="en-US"/>
           </a:p>
@@ -808,7 +825,7 @@
           <a:p>
             <a:fld id="{6160CE2C-618F-9444-BA8A-58E4C525A399}" type="datetimeFigureOut">
               <a:rPr lang="en-US" smtClean="0"/>
-              <a:t>9/2/17</a:t>
+              <a:t>12/31/17</a:t>
             </a:fld>
             <a:endParaRPr lang="en-US"/>
           </a:p>
@@ -1054,7 +1071,7 @@
           <a:p>
             <a:fld id="{6160CE2C-618F-9444-BA8A-58E4C525A399}" type="datetimeFigureOut">
               <a:rPr lang="en-US" smtClean="0"/>
-              <a:t>9/2/17</a:t>
+              <a:t>12/31/17</a:t>
             </a:fld>
             <a:endParaRPr lang="en-US"/>
           </a:p>
@@ -1342,7 +1359,7 @@
           <a:p>
             <a:fld id="{6160CE2C-618F-9444-BA8A-58E4C525A399}" type="datetimeFigureOut">
               <a:rPr lang="en-US" smtClean="0"/>
-              <a:t>9/2/17</a:t>
+              <a:t>12/31/17</a:t>
             </a:fld>
             <a:endParaRPr lang="en-US"/>
           </a:p>
@@ -1764,7 +1781,7 @@
           <a:p>
             <a:fld id="{6160CE2C-618F-9444-BA8A-58E4C525A399}" type="datetimeFigureOut">
               <a:rPr lang="en-US" smtClean="0"/>
-              <a:t>9/2/17</a:t>
+              <a:t>12/31/17</a:t>
             </a:fld>
             <a:endParaRPr lang="en-US"/>
           </a:p>
@@ -1882,7 +1899,7 @@
           <a:p>
             <a:fld id="{6160CE2C-618F-9444-BA8A-58E4C525A399}" type="datetimeFigureOut">
               <a:rPr lang="en-US" smtClean="0"/>
-              <a:t>9/2/17</a:t>
+              <a:t>12/31/17</a:t>
             </a:fld>
             <a:endParaRPr lang="en-US"/>
           </a:p>
@@ -1977,7 +1994,7 @@
           <a:p>
             <a:fld id="{6160CE2C-618F-9444-BA8A-58E4C525A399}" type="datetimeFigureOut">
               <a:rPr lang="en-US" smtClean="0"/>
-              <a:t>9/2/17</a:t>
+              <a:t>12/31/17</a:t>
             </a:fld>
             <a:endParaRPr lang="en-US"/>
           </a:p>
@@ -2254,7 +2271,7 @@
           <a:p>
             <a:fld id="{6160CE2C-618F-9444-BA8A-58E4C525A399}" type="datetimeFigureOut">
               <a:rPr lang="en-US" smtClean="0"/>
-              <a:t>9/2/17</a:t>
+              <a:t>12/31/17</a:t>
             </a:fld>
             <a:endParaRPr lang="en-US"/>
           </a:p>
@@ -2507,7 +2524,7 @@
           <a:p>
             <a:fld id="{6160CE2C-618F-9444-BA8A-58E4C525A399}" type="datetimeFigureOut">
               <a:rPr lang="en-US" smtClean="0"/>
-              <a:t>9/2/17</a:t>
+              <a:t>12/31/17</a:t>
             </a:fld>
             <a:endParaRPr lang="en-US"/>
           </a:p>
@@ -2720,7 +2737,7 @@
           <a:p>
             <a:fld id="{6160CE2C-618F-9444-BA8A-58E4C525A399}" type="datetimeFigureOut">
               <a:rPr lang="en-US" smtClean="0"/>
-              <a:t>9/2/17</a:t>
+              <a:t>12/31/17</a:t>
             </a:fld>
             <a:endParaRPr lang="en-US"/>
           </a:p>
@@ -3247,6 +3264,175 @@
 </p:sld>
 </file>
 
+<file path=ppt/slides/slide2.xml><?xml version="1.0" encoding="utf-8"?>
+<p:sld xmlns:a="http://schemas.openxmlformats.org/drawingml/2006/main" xmlns:r="http://schemas.openxmlformats.org/officeDocument/2006/relationships" xmlns:p="http://schemas.openxmlformats.org/presentationml/2006/main">
+  <p:cSld>
+    <p:bg>
+      <p:bgPr>
+        <a:solidFill>
+          <a:schemeClr val="tx1"/>
+        </a:solidFill>
+        <a:effectLst/>
+      </p:bgPr>
+    </p:bg>
+    <p:spTree>
+      <p:nvGrpSpPr>
+        <p:cNvPr id="1" name=""/>
+        <p:cNvGrpSpPr/>
+        <p:nvPr/>
+      </p:nvGrpSpPr>
+      <p:grpSpPr>
+        <a:xfrm>
+          <a:off x="0" y="0"/>
+          <a:ext cx="0" cy="0"/>
+          <a:chOff x="0" y="0"/>
+          <a:chExt cx="0" cy="0"/>
+        </a:xfrm>
+      </p:grpSpPr>
+      <p:grpSp>
+        <p:nvGrpSpPr>
+          <p:cNvPr id="12" name="Group 11"/>
+          <p:cNvGrpSpPr/>
+          <p:nvPr/>
+        </p:nvGrpSpPr>
+        <p:grpSpPr>
+          <a:xfrm>
+            <a:off x="2014968" y="580374"/>
+            <a:ext cx="5781591" cy="5781591"/>
+            <a:chOff x="411058" y="580375"/>
+            <a:chExt cx="2078182" cy="2078182"/>
+          </a:xfrm>
+        </p:grpSpPr>
+        <p:sp>
+          <p:nvSpPr>
+            <p:cNvPr id="13" name="Rounded Rectangle 12"/>
+            <p:cNvSpPr/>
+            <p:nvPr/>
+          </p:nvSpPr>
+          <p:spPr>
+            <a:xfrm>
+              <a:off x="411058" y="580375"/>
+              <a:ext cx="2078182" cy="2078182"/>
+            </a:xfrm>
+            <a:prstGeom prst="roundRect">
+              <a:avLst/>
+            </a:prstGeom>
+            <a:solidFill>
+              <a:schemeClr val="tx1"/>
+            </a:solidFill>
+            <a:ln w="88900" cmpd="sng">
+              <a:solidFill>
+                <a:schemeClr val="bg1"/>
+              </a:solidFill>
+            </a:ln>
+            <a:effectLst/>
+          </p:spPr>
+          <p:style>
+            <a:lnRef idx="1">
+              <a:schemeClr val="accent1"/>
+            </a:lnRef>
+            <a:fillRef idx="3">
+              <a:schemeClr val="accent1"/>
+            </a:fillRef>
+            <a:effectRef idx="2">
+              <a:schemeClr val="accent1"/>
+            </a:effectRef>
+            <a:fontRef idx="minor">
+              <a:schemeClr val="lt1"/>
+            </a:fontRef>
+          </p:style>
+          <p:txBody>
+            <a:bodyPr rtlCol="0" anchor="ctr"/>
+            <a:lstStyle/>
+            <a:p>
+              <a:pPr algn="ctr"/>
+              <a:endParaRPr lang="en-US"/>
+            </a:p>
+          </p:txBody>
+        </p:sp>
+        <p:sp>
+          <p:nvSpPr>
+            <p:cNvPr id="15" name="TextBox 14"/>
+            <p:cNvSpPr txBox="1"/>
+            <p:nvPr/>
+          </p:nvSpPr>
+          <p:spPr>
+            <a:xfrm>
+              <a:off x="411058" y="721026"/>
+              <a:ext cx="2078182" cy="696967"/>
+            </a:xfrm>
+            <a:prstGeom prst="rect">
+              <a:avLst/>
+            </a:prstGeom>
+            <a:noFill/>
+          </p:spPr>
+          <p:txBody>
+            <a:bodyPr wrap="square" rtlCol="0">
+              <a:spAutoFit/>
+            </a:bodyPr>
+            <a:lstStyle/>
+            <a:p>
+              <a:pPr algn="ctr"/>
+              <a:r>
+                <a:rPr lang="en-US" sz="6000" b="1" dirty="0" smtClean="0">
+                  <a:solidFill>
+                    <a:schemeClr val="bg1"/>
+                  </a:solidFill>
+                </a:rPr>
+                <a:t>Experimental Design</a:t>
+              </a:r>
+              <a:endParaRPr lang="en-US" sz="6000" b="1" dirty="0">
+                <a:solidFill>
+                  <a:schemeClr val="bg1"/>
+                </a:solidFill>
+              </a:endParaRPr>
+            </a:p>
+          </p:txBody>
+        </p:sp>
+      </p:grpSp>
+      <p:pic>
+        <p:nvPicPr>
+          <p:cNvPr id="2" name="Picture 1"/>
+          <p:cNvPicPr>
+            <a:picLocks noChangeAspect="1"/>
+          </p:cNvPicPr>
+          <p:nvPr/>
+        </p:nvPicPr>
+        <p:blipFill>
+          <a:blip r:embed="rId2">
+            <a:extLst>
+              <a:ext uri="{28A0092B-C50C-407E-A947-70E740481C1C}">
+                <a14:useLocalDpi xmlns:a14="http://schemas.microsoft.com/office/drawing/2010/main" val="0"/>
+              </a:ext>
+            </a:extLst>
+          </a:blip>
+          <a:stretch>
+            <a:fillRect/>
+          </a:stretch>
+        </p:blipFill>
+        <p:spPr>
+          <a:xfrm>
+            <a:off x="2369892" y="3301960"/>
+            <a:ext cx="5130365" cy="2460546"/>
+          </a:xfrm>
+          <a:prstGeom prst="rect">
+            <a:avLst/>
+          </a:prstGeom>
+        </p:spPr>
+      </p:pic>
+    </p:spTree>
+    <p:extLst>
+      <p:ext uri="{BB962C8B-B14F-4D97-AF65-F5344CB8AC3E}">
+        <p14:creationId xmlns:p14="http://schemas.microsoft.com/office/powerpoint/2010/main" val="646271757"/>
+      </p:ext>
+    </p:extLst>
+  </p:cSld>
+  <p:clrMapOvr>
+    <a:masterClrMapping/>
+  </p:clrMapOvr>
+</p:sld>
+</file>
+
 <file path=ppt/theme/theme1.xml><?xml version="1.0" encoding="utf-8"?>
 <a:theme xmlns:a="http://schemas.openxmlformats.org/drawingml/2006/main" name="Office Theme">
   <a:themeElements>

</xml_diff>